<commit_message>
fix presentations - font color
</commit_message>
<xml_diff>
--- a/presetntations/Presentation_1_Scala_what_is_it.pptx
+++ b/presetntations/Presentation_1_Scala_what_is_it.pptx
@@ -15952,41 +15952,81 @@
           <a:lstStyle/>
           <a:p>
             <a:r>
-              <a:rPr lang="pl-PL" dirty="0"/>
+              <a:rPr lang="pl-PL" dirty="0">
+                <a:solidFill>
+                  <a:schemeClr val="bg1"/>
+                </a:solidFill>
+              </a:rPr>
               <a:t>THE NAME </a:t>
             </a:r>
             <a:r>
-              <a:rPr lang="pl-PL" i="1" dirty="0"/>
+              <a:rPr lang="pl-PL" i="1" dirty="0">
+                <a:solidFill>
+                  <a:schemeClr val="bg1"/>
+                </a:solidFill>
+              </a:rPr>
               <a:t>SCALA</a:t>
             </a:r>
             <a:r>
-              <a:rPr lang="pl-PL" dirty="0"/>
+              <a:rPr lang="pl-PL" dirty="0">
+                <a:solidFill>
+                  <a:schemeClr val="bg1"/>
+                </a:solidFill>
+              </a:rPr>
               <a:t> COMES FROM </a:t>
             </a:r>
             <a:r>
-              <a:rPr lang="pl-PL" i="1" dirty="0"/>
+              <a:rPr lang="pl-PL" i="1" dirty="0">
+                <a:solidFill>
+                  <a:schemeClr val="bg1"/>
+                </a:solidFill>
+              </a:rPr>
               <a:t>SCALABLE</a:t>
             </a:r>
-            <a:endParaRPr lang="pl-PL" dirty="0"/>
-          </a:p>
-          <a:p>
-            <a:r>
-              <a:rPr lang="pl-PL" dirty="0"/>
+            <a:endParaRPr lang="pl-PL" dirty="0">
+              <a:solidFill>
+                <a:schemeClr val="bg1"/>
+              </a:solidFill>
+            </a:endParaRPr>
+          </a:p>
+          <a:p>
+            <a:r>
+              <a:rPr lang="pl-PL" dirty="0">
+                <a:solidFill>
+                  <a:schemeClr val="bg1"/>
+                </a:solidFill>
+              </a:rPr>
               <a:t>SCALA COMBINES </a:t>
             </a:r>
             <a:r>
-              <a:rPr lang="pl-PL" i="1" dirty="0"/>
+              <a:rPr lang="pl-PL" i="1" dirty="0">
+                <a:solidFill>
+                  <a:schemeClr val="bg1"/>
+                </a:solidFill>
+              </a:rPr>
               <a:t>CONCISE SYNTAX</a:t>
             </a:r>
             <a:r>
-              <a:rPr lang="pl-PL" dirty="0"/>
+              <a:rPr lang="pl-PL" dirty="0">
+                <a:solidFill>
+                  <a:schemeClr val="bg1"/>
+                </a:solidFill>
+              </a:rPr>
               <a:t> WITH </a:t>
             </a:r>
             <a:r>
-              <a:rPr lang="pl-PL" i="1" dirty="0"/>
+              <a:rPr lang="pl-PL" i="1" dirty="0">
+                <a:solidFill>
+                  <a:schemeClr val="bg1"/>
+                </a:solidFill>
+              </a:rPr>
               <a:t>SCALABILITY</a:t>
             </a:r>
-            <a:endParaRPr lang="pl-PL" dirty="0"/>
+            <a:endParaRPr lang="pl-PL" dirty="0">
+              <a:solidFill>
+                <a:schemeClr val="bg1"/>
+              </a:solidFill>
+            </a:endParaRPr>
           </a:p>
         </p:txBody>
       </p:sp>

</xml_diff>